<commit_message>
Remove unused timestamp converter and extra fields
</commit_message>
<xml_diff>
--- a/Slides/csv2circa.pptx
+++ b/Slides/csv2circa.pptx
@@ -6424,76 +6424,36 @@
           <a:chExt cx="0" cy="0"/>
         </a:xfrm>
       </p:grpSpPr>
-      <p:sp>
-        <p:nvSpPr>
-          <p:cNvPr id="7" name="Title 6">
-            <a:extLst>
-              <a:ext uri="{FF2B5EF4-FFF2-40B4-BE49-F238E27FC236}">
-                <a16:creationId xmlns:a16="http://schemas.microsoft.com/office/drawing/2014/main" id="{98D150CF-F888-48EA-89E8-311ED5E9161B}"/>
-              </a:ext>
-            </a:extLst>
-          </p:cNvPr>
-          <p:cNvSpPr>
-            <a:spLocks noGrp="1"/>
-          </p:cNvSpPr>
-          <p:nvPr>
-            <p:ph type="ctrTitle"/>
-          </p:nvPr>
-        </p:nvSpPr>
-        <p:spPr>
-          <a:xfrm>
-            <a:off x="558808" y="131847"/>
-            <a:ext cx="6815446" cy="3887390"/>
-          </a:xfrm>
-        </p:spPr>
-        <p:txBody>
-          <a:bodyPr/>
-          <a:lstStyle/>
-          <a:p>
-            <a:r>
-              <a:rPr lang="en-US" sz="8000" dirty="0"/>
-              <a:t>csv2circa</a:t>
-            </a:r>
-            <a:br>
-              <a:rPr lang="en-US" sz="8000" dirty="0"/>
-            </a:br>
-            <a:endParaRPr lang="en-US" dirty="0"/>
-          </a:p>
-        </p:txBody>
-      </p:sp>
-      <p:sp>
-        <p:nvSpPr>
-          <p:cNvPr id="8" name="Subtitle 7">
-            <a:extLst>
-              <a:ext uri="{FF2B5EF4-FFF2-40B4-BE49-F238E27FC236}">
-                <a16:creationId xmlns:a16="http://schemas.microsoft.com/office/drawing/2014/main" id="{6BBE0348-1527-4055-BA8A-E2754222743D}"/>
-              </a:ext>
-            </a:extLst>
-          </p:cNvPr>
-          <p:cNvSpPr>
-            <a:spLocks noGrp="1"/>
-          </p:cNvSpPr>
-          <p:nvPr>
-            <p:ph type="subTitle" idx="1"/>
-          </p:nvPr>
-        </p:nvSpPr>
-        <p:spPr>
-          <a:xfrm>
-            <a:off x="6374921" y="409461"/>
-            <a:ext cx="6158628" cy="541034"/>
-          </a:xfrm>
-        </p:spPr>
-        <p:txBody>
-          <a:bodyPr/>
-          <a:lstStyle/>
-          <a:p>
-            <a:r>
-              <a:rPr lang="en-US" dirty="0"/>
-              <a:t>In Unity</a:t>
-            </a:r>
-          </a:p>
-        </p:txBody>
-      </p:sp>
+      <p:pic>
+        <p:nvPicPr>
+          <p:cNvPr id="23" name="Picture 22">
+            <a:extLst>
+              <a:ext uri="{FF2B5EF4-FFF2-40B4-BE49-F238E27FC236}">
+                <a16:creationId xmlns:a16="http://schemas.microsoft.com/office/drawing/2014/main" id="{22C7956E-5B7D-8BEA-0810-8D66C7AF4023}"/>
+              </a:ext>
+            </a:extLst>
+          </p:cNvPr>
+          <p:cNvPicPr>
+            <a:picLocks noChangeAspect="1"/>
+          </p:cNvPicPr>
+          <p:nvPr/>
+        </p:nvPicPr>
+        <p:blipFill>
+          <a:blip r:embed="rId2"/>
+          <a:stretch>
+            <a:fillRect/>
+          </a:stretch>
+        </p:blipFill>
+        <p:spPr>
+          <a:xfrm>
+            <a:off x="6095999" y="0"/>
+            <a:ext cx="1" cy="6858000"/>
+          </a:xfrm>
+          <a:prstGeom prst="rect">
+            <a:avLst/>
+          </a:prstGeom>
+        </p:spPr>
+      </p:pic>
       <p:pic>
         <p:nvPicPr>
           <p:cNvPr id="5" name="Picture Placeholder 4" descr="A picture containing mountain, sky, outdoor, nature, sunrise ">
@@ -6511,7 +6471,7 @@
           </p:nvPr>
         </p:nvPicPr>
         <p:blipFill rotWithShape="1">
-          <a:blip r:embed="rId2" cstate="screen">
+          <a:blip r:embed="rId3" cstate="screen">
             <a:extLst>
               <a:ext uri="{28A0092B-C50C-407E-A947-70E740481C1C}">
                 <a14:useLocalDpi xmlns:a14="http://schemas.microsoft.com/office/drawing/2010/main" val="0"/>
@@ -6530,10 +6490,10 @@
       </p:pic>
       <p:pic>
         <p:nvPicPr>
-          <p:cNvPr id="3" name="Picture 2">
-            <a:extLst>
-              <a:ext uri="{FF2B5EF4-FFF2-40B4-BE49-F238E27FC236}">
-                <a16:creationId xmlns:a16="http://schemas.microsoft.com/office/drawing/2014/main" id="{C34AF739-CC21-DAD4-1A37-18EB9C381D26}"/>
+          <p:cNvPr id="4" name="Picture 3" descr="A screenshot of a video game&#10;&#10;Description automatically generated">
+            <a:extLst>
+              <a:ext uri="{FF2B5EF4-FFF2-40B4-BE49-F238E27FC236}">
+                <a16:creationId xmlns:a16="http://schemas.microsoft.com/office/drawing/2014/main" id="{1DCFD7CD-6226-FF05-BF90-840272E0449A}"/>
               </a:ext>
             </a:extLst>
           </p:cNvPr>
@@ -6542,118 +6502,97 @@
           </p:cNvPicPr>
           <p:nvPr/>
         </p:nvPicPr>
-        <p:blipFill>
-          <a:blip r:embed="rId3"/>
-          <a:stretch>
-            <a:fillRect/>
-          </a:stretch>
+        <p:blipFill rotWithShape="1">
+          <a:blip r:embed="rId4"/>
+          <a:srcRect b="26145"/>
+          <a:stretch/>
         </p:blipFill>
         <p:spPr>
           <a:xfrm>
-            <a:off x="6095994" y="3428989"/>
-            <a:ext cx="12" cy="22"/>
+            <a:off x="862452" y="3404527"/>
+            <a:ext cx="11024937" cy="2963063"/>
           </a:xfrm>
           <a:prstGeom prst="rect">
             <a:avLst/>
           </a:prstGeom>
         </p:spPr>
       </p:pic>
+      <p:sp>
+        <p:nvSpPr>
+          <p:cNvPr id="7" name="Title 6">
+            <a:extLst>
+              <a:ext uri="{FF2B5EF4-FFF2-40B4-BE49-F238E27FC236}">
+                <a16:creationId xmlns:a16="http://schemas.microsoft.com/office/drawing/2014/main" id="{98D150CF-F888-48EA-89E8-311ED5E9161B}"/>
+              </a:ext>
+            </a:extLst>
+          </p:cNvPr>
+          <p:cNvSpPr>
+            <a:spLocks noGrp="1"/>
+          </p:cNvSpPr>
+          <p:nvPr>
+            <p:ph type="ctrTitle"/>
+          </p:nvPr>
+        </p:nvSpPr>
+        <p:spPr>
+          <a:xfrm>
+            <a:off x="558808" y="131847"/>
+            <a:ext cx="6815446" cy="3887390"/>
+          </a:xfrm>
+        </p:spPr>
+        <p:txBody>
+          <a:bodyPr/>
+          <a:lstStyle/>
+          <a:p>
+            <a:r>
+              <a:rPr lang="en-US" sz="8000" dirty="0"/>
+              <a:t>csv2circa</a:t>
+            </a:r>
+            <a:br>
+              <a:rPr lang="en-US" sz="8000" dirty="0"/>
+            </a:br>
+            <a:endParaRPr lang="en-US" dirty="0"/>
+          </a:p>
+        </p:txBody>
+      </p:sp>
+      <p:sp>
+        <p:nvSpPr>
+          <p:cNvPr id="8" name="Subtitle 7">
+            <a:extLst>
+              <a:ext uri="{FF2B5EF4-FFF2-40B4-BE49-F238E27FC236}">
+                <a16:creationId xmlns:a16="http://schemas.microsoft.com/office/drawing/2014/main" id="{6BBE0348-1527-4055-BA8A-E2754222743D}"/>
+              </a:ext>
+            </a:extLst>
+          </p:cNvPr>
+          <p:cNvSpPr>
+            <a:spLocks noGrp="1"/>
+          </p:cNvSpPr>
+          <p:nvPr>
+            <p:ph type="subTitle" idx="1"/>
+          </p:nvPr>
+        </p:nvSpPr>
+        <p:spPr>
+          <a:xfrm>
+            <a:off x="6374921" y="409461"/>
+            <a:ext cx="6158628" cy="541034"/>
+          </a:xfrm>
+        </p:spPr>
+        <p:txBody>
+          <a:bodyPr/>
+          <a:lstStyle/>
+          <a:p>
+            <a:r>
+              <a:rPr lang="en-US" dirty="0"/>
+              <a:t>In Unity</a:t>
+            </a:r>
+          </a:p>
+        </p:txBody>
+      </p:sp>
       <p:pic>
         <p:nvPicPr>
-          <p:cNvPr id="6" name="Picture 5">
-            <a:extLst>
-              <a:ext uri="{FF2B5EF4-FFF2-40B4-BE49-F238E27FC236}">
-                <a16:creationId xmlns:a16="http://schemas.microsoft.com/office/drawing/2014/main" id="{1C3213D8-04F1-B7E1-5CC2-834E0A6A0B5A}"/>
-              </a:ext>
-            </a:extLst>
-          </p:cNvPr>
-          <p:cNvPicPr>
-            <a:picLocks noChangeAspect="1"/>
-          </p:cNvPicPr>
-          <p:nvPr/>
-        </p:nvPicPr>
-        <p:blipFill>
-          <a:blip r:embed="rId3"/>
-          <a:stretch>
-            <a:fillRect/>
-          </a:stretch>
-        </p:blipFill>
-        <p:spPr>
-          <a:xfrm>
-            <a:off x="6095994" y="3428989"/>
-            <a:ext cx="12" cy="22"/>
-          </a:xfrm>
-          <a:prstGeom prst="rect">
-            <a:avLst/>
-          </a:prstGeom>
-        </p:spPr>
-      </p:pic>
-      <p:pic>
-        <p:nvPicPr>
-          <p:cNvPr id="10" name="Picture 9">
-            <a:extLst>
-              <a:ext uri="{FF2B5EF4-FFF2-40B4-BE49-F238E27FC236}">
-                <a16:creationId xmlns:a16="http://schemas.microsoft.com/office/drawing/2014/main" id="{3FA797E5-349F-B70D-B195-089868CB5972}"/>
-              </a:ext>
-            </a:extLst>
-          </p:cNvPr>
-          <p:cNvPicPr>
-            <a:picLocks noChangeAspect="1"/>
-          </p:cNvPicPr>
-          <p:nvPr/>
-        </p:nvPicPr>
-        <p:blipFill>
-          <a:blip r:embed="rId4"/>
-          <a:stretch>
-            <a:fillRect/>
-          </a:stretch>
-        </p:blipFill>
-        <p:spPr>
-          <a:xfrm>
-            <a:off x="6095994" y="3428989"/>
-            <a:ext cx="12" cy="22"/>
-          </a:xfrm>
-          <a:prstGeom prst="rect">
-            <a:avLst/>
-          </a:prstGeom>
-        </p:spPr>
-      </p:pic>
-      <p:pic>
-        <p:nvPicPr>
-          <p:cNvPr id="12" name="Picture 11">
-            <a:extLst>
-              <a:ext uri="{FF2B5EF4-FFF2-40B4-BE49-F238E27FC236}">
-                <a16:creationId xmlns:a16="http://schemas.microsoft.com/office/drawing/2014/main" id="{7B8495AF-4F49-1554-3DB0-92FEBBEBB764}"/>
-              </a:ext>
-            </a:extLst>
-          </p:cNvPr>
-          <p:cNvPicPr>
-            <a:picLocks noChangeAspect="1"/>
-          </p:cNvPicPr>
-          <p:nvPr/>
-        </p:nvPicPr>
-        <p:blipFill>
-          <a:blip r:embed="rId4"/>
-          <a:stretch>
-            <a:fillRect/>
-          </a:stretch>
-        </p:blipFill>
-        <p:spPr>
-          <a:xfrm>
-            <a:off x="6095994" y="3428989"/>
-            <a:ext cx="12" cy="22"/>
-          </a:xfrm>
-          <a:prstGeom prst="rect">
-            <a:avLst/>
-          </a:prstGeom>
-        </p:spPr>
-      </p:pic>
-      <p:pic>
-        <p:nvPicPr>
-          <p:cNvPr id="16" name="Picture 15">
-            <a:extLst>
-              <a:ext uri="{FF2B5EF4-FFF2-40B4-BE49-F238E27FC236}">
-                <a16:creationId xmlns:a16="http://schemas.microsoft.com/office/drawing/2014/main" id="{15CC87D7-DB3D-4F57-94DE-972654BE751C}"/>
+          <p:cNvPr id="3" name="Picture 2">
+            <a:extLst>
+              <a:ext uri="{FF2B5EF4-FFF2-40B4-BE49-F238E27FC236}">
+                <a16:creationId xmlns:a16="http://schemas.microsoft.com/office/drawing/2014/main" id="{C34AF739-CC21-DAD4-1A37-18EB9C381D26}"/>
               </a:ext>
             </a:extLst>
           </p:cNvPr>
@@ -6670,67 +6609,50 @@
         </p:blipFill>
         <p:spPr>
           <a:xfrm>
-            <a:off x="6095994" y="3428996"/>
-            <a:ext cx="12" cy="7"/>
+            <a:off x="6095994" y="3428989"/>
+            <a:ext cx="12" cy="22"/>
           </a:xfrm>
           <a:prstGeom prst="rect">
             <a:avLst/>
           </a:prstGeom>
         </p:spPr>
       </p:pic>
-      <p:sp>
-        <p:nvSpPr>
-          <p:cNvPr id="19" name="Arrow: Right 18">
-            <a:extLst>
-              <a:ext uri="{FF2B5EF4-FFF2-40B4-BE49-F238E27FC236}">
-                <a16:creationId xmlns:a16="http://schemas.microsoft.com/office/drawing/2014/main" id="{B5DF8053-959F-AD91-CE65-E1212BE93FE8}"/>
-              </a:ext>
-            </a:extLst>
-          </p:cNvPr>
-          <p:cNvSpPr/>
+      <p:pic>
+        <p:nvPicPr>
+          <p:cNvPr id="6" name="Picture 5">
+            <a:extLst>
+              <a:ext uri="{FF2B5EF4-FFF2-40B4-BE49-F238E27FC236}">
+                <a16:creationId xmlns:a16="http://schemas.microsoft.com/office/drawing/2014/main" id="{1C3213D8-04F1-B7E1-5CC2-834E0A6A0B5A}"/>
+              </a:ext>
+            </a:extLst>
+          </p:cNvPr>
+          <p:cNvPicPr>
+            <a:picLocks noChangeAspect="1"/>
+          </p:cNvPicPr>
           <p:nvPr/>
-        </p:nvSpPr>
-        <p:spPr>
-          <a:xfrm>
-            <a:off x="5186688" y="3277410"/>
-            <a:ext cx="866274" cy="667753"/>
-          </a:xfrm>
-          <a:prstGeom prst="rightArrow">
+        </p:nvPicPr>
+        <p:blipFill>
+          <a:blip r:embed="rId5"/>
+          <a:stretch>
+            <a:fillRect/>
+          </a:stretch>
+        </p:blipFill>
+        <p:spPr>
+          <a:xfrm>
+            <a:off x="6095994" y="3428989"/>
+            <a:ext cx="12" cy="22"/>
+          </a:xfrm>
+          <a:prstGeom prst="rect">
             <a:avLst/>
           </a:prstGeom>
-          <a:solidFill>
-            <a:schemeClr val="bg1"/>
-          </a:solidFill>
-        </p:spPr>
-        <p:style>
-          <a:lnRef idx="1">
-            <a:schemeClr val="dk1"/>
-          </a:lnRef>
-          <a:fillRef idx="2">
-            <a:schemeClr val="dk1"/>
-          </a:fillRef>
-          <a:effectRef idx="1">
-            <a:schemeClr val="dk1"/>
-          </a:effectRef>
-          <a:fontRef idx="minor">
-            <a:schemeClr val="dk1"/>
-          </a:fontRef>
-        </p:style>
-        <p:txBody>
-          <a:bodyPr rtlCol="0" anchor="ctr"/>
-          <a:lstStyle/>
-          <a:p>
-            <a:pPr algn="ctr"/>
-            <a:endParaRPr lang="en-US"/>
-          </a:p>
-        </p:txBody>
-      </p:sp>
+        </p:spPr>
+      </p:pic>
       <p:pic>
         <p:nvPicPr>
-          <p:cNvPr id="23" name="Picture 22">
-            <a:extLst>
-              <a:ext uri="{FF2B5EF4-FFF2-40B4-BE49-F238E27FC236}">
-                <a16:creationId xmlns:a16="http://schemas.microsoft.com/office/drawing/2014/main" id="{22C7956E-5B7D-8BEA-0810-8D66C7AF4023}"/>
+          <p:cNvPr id="10" name="Picture 9">
+            <a:extLst>
+              <a:ext uri="{FF2B5EF4-FFF2-40B4-BE49-F238E27FC236}">
+                <a16:creationId xmlns:a16="http://schemas.microsoft.com/office/drawing/2014/main" id="{3FA797E5-349F-B70D-B195-089868CB5972}"/>
               </a:ext>
             </a:extLst>
           </p:cNvPr>
@@ -6747,14 +6669,121 @@
         </p:blipFill>
         <p:spPr>
           <a:xfrm>
-            <a:off x="6095999" y="0"/>
-            <a:ext cx="1" cy="6858000"/>
+            <a:off x="6095994" y="3428989"/>
+            <a:ext cx="12" cy="22"/>
           </a:xfrm>
           <a:prstGeom prst="rect">
             <a:avLst/>
           </a:prstGeom>
         </p:spPr>
       </p:pic>
+      <p:pic>
+        <p:nvPicPr>
+          <p:cNvPr id="12" name="Picture 11">
+            <a:extLst>
+              <a:ext uri="{FF2B5EF4-FFF2-40B4-BE49-F238E27FC236}">
+                <a16:creationId xmlns:a16="http://schemas.microsoft.com/office/drawing/2014/main" id="{7B8495AF-4F49-1554-3DB0-92FEBBEBB764}"/>
+              </a:ext>
+            </a:extLst>
+          </p:cNvPr>
+          <p:cNvPicPr>
+            <a:picLocks noChangeAspect="1"/>
+          </p:cNvPicPr>
+          <p:nvPr/>
+        </p:nvPicPr>
+        <p:blipFill>
+          <a:blip r:embed="rId6"/>
+          <a:stretch>
+            <a:fillRect/>
+          </a:stretch>
+        </p:blipFill>
+        <p:spPr>
+          <a:xfrm>
+            <a:off x="6095994" y="3428989"/>
+            <a:ext cx="12" cy="22"/>
+          </a:xfrm>
+          <a:prstGeom prst="rect">
+            <a:avLst/>
+          </a:prstGeom>
+        </p:spPr>
+      </p:pic>
+      <p:pic>
+        <p:nvPicPr>
+          <p:cNvPr id="16" name="Picture 15">
+            <a:extLst>
+              <a:ext uri="{FF2B5EF4-FFF2-40B4-BE49-F238E27FC236}">
+                <a16:creationId xmlns:a16="http://schemas.microsoft.com/office/drawing/2014/main" id="{15CC87D7-DB3D-4F57-94DE-972654BE751C}"/>
+              </a:ext>
+            </a:extLst>
+          </p:cNvPr>
+          <p:cNvPicPr>
+            <a:picLocks noChangeAspect="1"/>
+          </p:cNvPicPr>
+          <p:nvPr/>
+        </p:nvPicPr>
+        <p:blipFill>
+          <a:blip r:embed="rId7"/>
+          <a:stretch>
+            <a:fillRect/>
+          </a:stretch>
+        </p:blipFill>
+        <p:spPr>
+          <a:xfrm>
+            <a:off x="6095994" y="3428996"/>
+            <a:ext cx="12" cy="7"/>
+          </a:xfrm>
+          <a:prstGeom prst="rect">
+            <a:avLst/>
+          </a:prstGeom>
+        </p:spPr>
+      </p:pic>
+      <p:sp>
+        <p:nvSpPr>
+          <p:cNvPr id="19" name="Arrow: Right 18">
+            <a:extLst>
+              <a:ext uri="{FF2B5EF4-FFF2-40B4-BE49-F238E27FC236}">
+                <a16:creationId xmlns:a16="http://schemas.microsoft.com/office/drawing/2014/main" id="{B5DF8053-959F-AD91-CE65-E1212BE93FE8}"/>
+              </a:ext>
+            </a:extLst>
+          </p:cNvPr>
+          <p:cNvSpPr/>
+          <p:nvPr/>
+        </p:nvSpPr>
+        <p:spPr>
+          <a:xfrm>
+            <a:off x="5186688" y="3277410"/>
+            <a:ext cx="866274" cy="667753"/>
+          </a:xfrm>
+          <a:prstGeom prst="rightArrow">
+            <a:avLst/>
+          </a:prstGeom>
+          <a:solidFill>
+            <a:schemeClr val="bg1"/>
+          </a:solidFill>
+        </p:spPr>
+        <p:style>
+          <a:lnRef idx="1">
+            <a:schemeClr val="dk1"/>
+          </a:lnRef>
+          <a:fillRef idx="2">
+            <a:schemeClr val="dk1"/>
+          </a:fillRef>
+          <a:effectRef idx="1">
+            <a:schemeClr val="dk1"/>
+          </a:effectRef>
+          <a:fontRef idx="minor">
+            <a:schemeClr val="dk1"/>
+          </a:fontRef>
+        </p:style>
+        <p:txBody>
+          <a:bodyPr rtlCol="0" anchor="ctr"/>
+          <a:lstStyle/>
+          <a:p>
+            <a:pPr algn="ctr"/>
+            <a:endParaRPr lang="en-US"/>
+          </a:p>
+        </p:txBody>
+      </p:sp>
       <p:sp>
         <p:nvSpPr>
           <p:cNvPr id="13" name="Subtitle 7">
@@ -7165,36 +7194,6 @@
           <p:nvPr/>
         </p:nvPicPr>
         <p:blipFill>
-          <a:blip r:embed="rId7"/>
-          <a:stretch>
-            <a:fillRect/>
-          </a:stretch>
-        </p:blipFill>
-        <p:spPr>
-          <a:xfrm>
-            <a:off x="6095965" y="3428988"/>
-            <a:ext cx="69" cy="24"/>
-          </a:xfrm>
-          <a:prstGeom prst="rect">
-            <a:avLst/>
-          </a:prstGeom>
-        </p:spPr>
-      </p:pic>
-      <p:pic>
-        <p:nvPicPr>
-          <p:cNvPr id="21" name="Picture 20" descr="A screenshot of a computer&#10;&#10;Description automatically generated with medium confidence">
-            <a:extLst>
-              <a:ext uri="{FF2B5EF4-FFF2-40B4-BE49-F238E27FC236}">
-                <a16:creationId xmlns:a16="http://schemas.microsoft.com/office/drawing/2014/main" id="{093485E2-43B8-788D-E8B1-FD46B105637C}"/>
-              </a:ext>
-            </a:extLst>
-          </p:cNvPr>
-          <p:cNvPicPr>
-            <a:picLocks noChangeAspect="1"/>
-          </p:cNvPicPr>
-          <p:nvPr/>
-        </p:nvPicPr>
-        <p:blipFill>
           <a:blip r:embed="rId8"/>
           <a:stretch>
             <a:fillRect/>
@@ -7202,8 +7201,8 @@
         </p:blipFill>
         <p:spPr>
           <a:xfrm>
-            <a:off x="613611" y="2635945"/>
-            <a:ext cx="11132663" cy="3815395"/>
+            <a:off x="6095965" y="3428988"/>
+            <a:ext cx="69" cy="24"/>
           </a:xfrm>
           <a:prstGeom prst="rect">
             <a:avLst/>
@@ -7232,8 +7231,8 @@
         </p:blipFill>
         <p:spPr>
           <a:xfrm>
-            <a:off x="2249494" y="1534408"/>
-            <a:ext cx="5124760" cy="2414198"/>
+            <a:off x="2050972" y="1490049"/>
+            <a:ext cx="5801767" cy="2733126"/>
           </a:xfrm>
           <a:prstGeom prst="round2DiagRect">
             <a:avLst>
@@ -14853,15 +14852,6 @@
 </file>
 
 <file path=customXml/item1.xml><?xml version="1.0" encoding="utf-8"?>
-<?mso-contentType ?>
-<FormTemplates xmlns="http://schemas.microsoft.com/sharepoint/v3/contenttype/forms">
-  <Display>DocumentLibraryForm</Display>
-  <Edit>DocumentLibraryForm</Edit>
-  <New>DocumentLibraryForm</New>
-</FormTemplates>
-</file>
-
-<file path=customXml/item2.xml><?xml version="1.0" encoding="utf-8"?>
 <p:properties xmlns:p="http://schemas.microsoft.com/office/2006/metadata/properties" xmlns:xsi="http://www.w3.org/2001/XMLSchema-instance" xmlns:pc="http://schemas.microsoft.com/office/infopath/2007/PartnerControls">
   <documentManagement>
     <Status xmlns="71af3243-3dd4-4a8d-8c0d-dd76da1f02a5">Not started</Status>
@@ -14878,6 +14868,15 @@
     <MediaServiceKeyPoints xmlns="71af3243-3dd4-4a8d-8c0d-dd76da1f02a5" xsi:nil="true"/>
   </documentManagement>
 </p:properties>
+</file>
+
+<file path=customXml/item2.xml><?xml version="1.0" encoding="utf-8"?>
+<?mso-contentType ?>
+<FormTemplates xmlns="http://schemas.microsoft.com/sharepoint/v3/contenttype/forms">
+  <Display>DocumentLibraryForm</Display>
+  <Edit>DocumentLibraryForm</Edit>
+  <New>DocumentLibraryForm</New>
+</FormTemplates>
 </file>
 
 <file path=customXml/item3.xml><?xml version="1.0" encoding="utf-8"?>
@@ -15157,14 +15156,6 @@
 </file>
 
 <file path=customXml/itemProps1.xml><?xml version="1.0" encoding="utf-8"?>
-<ds:datastoreItem xmlns:ds="http://schemas.openxmlformats.org/officeDocument/2006/customXml" ds:itemID="{A5CCB28C-7D26-4A36-9CFC-D739C28F3D18}">
-  <ds:schemaRefs>
-    <ds:schemaRef ds:uri="http://schemas.microsoft.com/sharepoint/v3/contenttype/forms"/>
-  </ds:schemaRefs>
-</ds:datastoreItem>
-</file>
-
-<file path=customXml/itemProps2.xml><?xml version="1.0" encoding="utf-8"?>
 <ds:datastoreItem xmlns:ds="http://schemas.openxmlformats.org/officeDocument/2006/customXml" ds:itemID="{08757C30-AE9A-4680-90EB-19D282EC2B7C}">
   <ds:schemaRefs>
     <ds:schemaRef ds:uri="http://schemas.microsoft.com/office/2006/metadata/properties"/>
@@ -15172,6 +15163,14 @@
     <ds:schemaRef ds:uri="71af3243-3dd4-4a8d-8c0d-dd76da1f02a5"/>
     <ds:schemaRef ds:uri="http://schemas.microsoft.com/sharepoint/v3"/>
     <ds:schemaRef ds:uri="230e9df3-be65-4c73-a93b-d1236ebd677e"/>
+  </ds:schemaRefs>
+</ds:datastoreItem>
+</file>
+
+<file path=customXml/itemProps2.xml><?xml version="1.0" encoding="utf-8"?>
+<ds:datastoreItem xmlns:ds="http://schemas.openxmlformats.org/officeDocument/2006/customXml" ds:itemID="{A5CCB28C-7D26-4A36-9CFC-D739C28F3D18}">
+  <ds:schemaRefs>
+    <ds:schemaRef ds:uri="http://schemas.microsoft.com/sharepoint/v3/contenttype/forms"/>
   </ds:schemaRefs>
 </ds:datastoreItem>
 </file>

</xml_diff>